<commit_message>
2021-03-18 Text structure for final release (todo: all links)
</commit_message>
<xml_diff>
--- a/BIRT-Internet-Page-Structure_V1.0.0.pptx
+++ b/BIRT-Internet-Page-Structure_V1.0.0.pptx
@@ -13,6 +13,9 @@
     <p:sldId id="262" r:id="rId7"/>
     <p:sldId id="263" r:id="rId8"/>
     <p:sldId id="264" r:id="rId9"/>
+    <p:sldId id="265" r:id="rId10"/>
+    <p:sldId id="266" r:id="rId11"/>
+    <p:sldId id="267" r:id="rId12"/>
   </p:sldIdLst>
   <p:sldSz cx="9144000" cy="6858000" type="screen4x3"/>
   <p:notesSz cx="7104063" cy="10234613"/>
@@ -295,7 +298,7 @@
           <a:p>
             <a:fld id="{CD676799-9F0D-4C3A-B3FF-9F2E058B3467}" type="datetimeFigureOut">
               <a:rPr lang="de-DE" smtClean="0"/>
-              <a:t>14.03.2021</a:t>
+              <a:t>16.03.2021</a:t>
             </a:fld>
             <a:endParaRPr lang="de-DE"/>
           </a:p>
@@ -465,7 +468,7 @@
           <a:p>
             <a:fld id="{CD676799-9F0D-4C3A-B3FF-9F2E058B3467}" type="datetimeFigureOut">
               <a:rPr lang="de-DE" smtClean="0"/>
-              <a:t>14.03.2021</a:t>
+              <a:t>16.03.2021</a:t>
             </a:fld>
             <a:endParaRPr lang="de-DE"/>
           </a:p>
@@ -645,7 +648,7 @@
           <a:p>
             <a:fld id="{CD676799-9F0D-4C3A-B3FF-9F2E058B3467}" type="datetimeFigureOut">
               <a:rPr lang="de-DE" smtClean="0"/>
-              <a:t>14.03.2021</a:t>
+              <a:t>16.03.2021</a:t>
             </a:fld>
             <a:endParaRPr lang="de-DE"/>
           </a:p>
@@ -815,7 +818,7 @@
           <a:p>
             <a:fld id="{CD676799-9F0D-4C3A-B3FF-9F2E058B3467}" type="datetimeFigureOut">
               <a:rPr lang="de-DE" smtClean="0"/>
-              <a:t>14.03.2021</a:t>
+              <a:t>16.03.2021</a:t>
             </a:fld>
             <a:endParaRPr lang="de-DE"/>
           </a:p>
@@ -1061,7 +1064,7 @@
           <a:p>
             <a:fld id="{CD676799-9F0D-4C3A-B3FF-9F2E058B3467}" type="datetimeFigureOut">
               <a:rPr lang="de-DE" smtClean="0"/>
-              <a:t>14.03.2021</a:t>
+              <a:t>16.03.2021</a:t>
             </a:fld>
             <a:endParaRPr lang="de-DE"/>
           </a:p>
@@ -1349,7 +1352,7 @@
           <a:p>
             <a:fld id="{CD676799-9F0D-4C3A-B3FF-9F2E058B3467}" type="datetimeFigureOut">
               <a:rPr lang="de-DE" smtClean="0"/>
-              <a:t>14.03.2021</a:t>
+              <a:t>16.03.2021</a:t>
             </a:fld>
             <a:endParaRPr lang="de-DE"/>
           </a:p>
@@ -1771,7 +1774,7 @@
           <a:p>
             <a:fld id="{CD676799-9F0D-4C3A-B3FF-9F2E058B3467}" type="datetimeFigureOut">
               <a:rPr lang="de-DE" smtClean="0"/>
-              <a:t>14.03.2021</a:t>
+              <a:t>16.03.2021</a:t>
             </a:fld>
             <a:endParaRPr lang="de-DE"/>
           </a:p>
@@ -1889,7 +1892,7 @@
           <a:p>
             <a:fld id="{CD676799-9F0D-4C3A-B3FF-9F2E058B3467}" type="datetimeFigureOut">
               <a:rPr lang="de-DE" smtClean="0"/>
-              <a:t>14.03.2021</a:t>
+              <a:t>16.03.2021</a:t>
             </a:fld>
             <a:endParaRPr lang="de-DE"/>
           </a:p>
@@ -1984,7 +1987,7 @@
           <a:p>
             <a:fld id="{CD676799-9F0D-4C3A-B3FF-9F2E058B3467}" type="datetimeFigureOut">
               <a:rPr lang="de-DE" smtClean="0"/>
-              <a:t>14.03.2021</a:t>
+              <a:t>16.03.2021</a:t>
             </a:fld>
             <a:endParaRPr lang="de-DE"/>
           </a:p>
@@ -2261,7 +2264,7 @@
           <a:p>
             <a:fld id="{CD676799-9F0D-4C3A-B3FF-9F2E058B3467}" type="datetimeFigureOut">
               <a:rPr lang="de-DE" smtClean="0"/>
-              <a:t>14.03.2021</a:t>
+              <a:t>16.03.2021</a:t>
             </a:fld>
             <a:endParaRPr lang="de-DE"/>
           </a:p>
@@ -2514,7 +2517,7 @@
           <a:p>
             <a:fld id="{CD676799-9F0D-4C3A-B3FF-9F2E058B3467}" type="datetimeFigureOut">
               <a:rPr lang="de-DE" smtClean="0"/>
-              <a:t>14.03.2021</a:t>
+              <a:t>16.03.2021</a:t>
             </a:fld>
             <a:endParaRPr lang="de-DE"/>
           </a:p>
@@ -2727,7 +2730,7 @@
           <a:p>
             <a:fld id="{CD676799-9F0D-4C3A-B3FF-9F2E058B3467}" type="datetimeFigureOut">
               <a:rPr lang="de-DE" smtClean="0"/>
-              <a:t>14.03.2021</a:t>
+              <a:t>16.03.2021</a:t>
             </a:fld>
             <a:endParaRPr lang="de-DE"/>
           </a:p>
@@ -3442,6 +3445,171 @@
 </p:sld>
 </file>
 
+<file path=ppt/slides/slide10.xml><?xml version="1.0" encoding="utf-8"?>
+<p:sld xmlns:a="http://schemas.openxmlformats.org/drawingml/2006/main" xmlns:r="http://schemas.openxmlformats.org/officeDocument/2006/relationships" xmlns:p="http://schemas.openxmlformats.org/presentationml/2006/main">
+  <p:cSld>
+    <p:spTree>
+      <p:nvGrpSpPr>
+        <p:cNvPr id="1" name=""/>
+        <p:cNvGrpSpPr/>
+        <p:nvPr/>
+      </p:nvGrpSpPr>
+      <p:grpSpPr>
+        <a:xfrm>
+          <a:off x="0" y="0"/>
+          <a:ext cx="0" cy="0"/>
+          <a:chOff x="0" y="0"/>
+          <a:chExt cx="0" cy="0"/>
+        </a:xfrm>
+      </p:grpSpPr>
+      <p:pic>
+        <p:nvPicPr>
+          <p:cNvPr id="3074" name="Picture 2"/>
+          <p:cNvPicPr>
+            <a:picLocks noChangeAspect="1" noChangeArrowheads="1"/>
+          </p:cNvPicPr>
+          <p:nvPr/>
+        </p:nvPicPr>
+        <p:blipFill>
+          <a:blip r:embed="rId2">
+            <a:extLst>
+              <a:ext uri="{28A0092B-C50C-407E-A947-70E740481C1C}">
+                <a14:useLocalDpi xmlns:a14="http://schemas.microsoft.com/office/drawing/2010/main" val="0"/>
+              </a:ext>
+            </a:extLst>
+          </a:blip>
+          <a:srcRect/>
+          <a:stretch>
+            <a:fillRect/>
+          </a:stretch>
+        </p:blipFill>
+        <p:spPr bwMode="auto">
+          <a:xfrm>
+            <a:off x="49989" y="116632"/>
+            <a:ext cx="9094011" cy="7075587"/>
+          </a:xfrm>
+          <a:prstGeom prst="rect">
+            <a:avLst/>
+          </a:prstGeom>
+          <a:noFill/>
+          <a:ln>
+            <a:noFill/>
+          </a:ln>
+          <a:effectLst/>
+          <a:extLst>
+            <a:ext uri="{909E8E84-426E-40DD-AFC4-6F175D3DCCD1}">
+              <a14:hiddenFill xmlns:a14="http://schemas.microsoft.com/office/drawing/2010/main">
+                <a:solidFill>
+                  <a:schemeClr val="accent1"/>
+                </a:solidFill>
+              </a14:hiddenFill>
+            </a:ext>
+            <a:ext uri="{91240B29-F687-4F45-9708-019B960494DF}">
+              <a14:hiddenLine xmlns:a14="http://schemas.microsoft.com/office/drawing/2010/main" w="9525">
+                <a:solidFill>
+                  <a:schemeClr val="tx1"/>
+                </a:solidFill>
+                <a:miter lim="800000"/>
+                <a:headEnd/>
+                <a:tailEnd/>
+              </a14:hiddenLine>
+            </a:ext>
+            <a:ext uri="{AF507438-7753-43E0-B8FC-AC1667EBCBE1}">
+              <a14:hiddenEffects xmlns:a14="http://schemas.microsoft.com/office/drawing/2010/main">
+                <a:effectLst>
+                  <a:outerShdw dist="35921" dir="2700000" algn="ctr" rotWithShape="0">
+                    <a:schemeClr val="bg2"/>
+                  </a:outerShdw>
+                </a:effectLst>
+              </a14:hiddenEffects>
+            </a:ext>
+          </a:extLst>
+        </p:spPr>
+      </p:pic>
+    </p:spTree>
+    <p:extLst>
+      <p:ext uri="{BB962C8B-B14F-4D97-AF65-F5344CB8AC3E}">
+        <p14:creationId xmlns:p14="http://schemas.microsoft.com/office/powerpoint/2010/main" val="4172306014"/>
+      </p:ext>
+    </p:extLst>
+  </p:cSld>
+  <p:clrMapOvr>
+    <a:masterClrMapping/>
+  </p:clrMapOvr>
+</p:sld>
+</file>
+
+<file path=ppt/slides/slide11.xml><?xml version="1.0" encoding="utf-8"?>
+<p:sld xmlns:a="http://schemas.openxmlformats.org/drawingml/2006/main" xmlns:r="http://schemas.openxmlformats.org/officeDocument/2006/relationships" xmlns:p="http://schemas.openxmlformats.org/presentationml/2006/main">
+  <p:cSld>
+    <p:spTree>
+      <p:nvGrpSpPr>
+        <p:cNvPr id="1" name=""/>
+        <p:cNvGrpSpPr/>
+        <p:nvPr/>
+      </p:nvGrpSpPr>
+      <p:grpSpPr>
+        <a:xfrm>
+          <a:off x="0" y="0"/>
+          <a:ext cx="0" cy="0"/>
+          <a:chOff x="0" y="0"/>
+          <a:chExt cx="0" cy="0"/>
+        </a:xfrm>
+      </p:grpSpPr>
+      <p:pic>
+        <p:nvPicPr>
+          <p:cNvPr id="4098" name="Picture 2" descr="Laptop | Kostenlose Icon"/>
+          <p:cNvPicPr>
+            <a:picLocks noChangeAspect="1" noChangeArrowheads="1"/>
+          </p:cNvPicPr>
+          <p:nvPr/>
+        </p:nvPicPr>
+        <p:blipFill>
+          <a:blip r:embed="rId2">
+            <a:extLst>
+              <a:ext uri="{28A0092B-C50C-407E-A947-70E740481C1C}">
+                <a14:useLocalDpi xmlns:a14="http://schemas.microsoft.com/office/drawing/2010/main" val="0"/>
+              </a:ext>
+            </a:extLst>
+          </a:blip>
+          <a:srcRect/>
+          <a:stretch>
+            <a:fillRect/>
+          </a:stretch>
+        </p:blipFill>
+        <p:spPr bwMode="auto">
+          <a:xfrm>
+            <a:off x="2195736" y="1052736"/>
+            <a:ext cx="4876800" cy="4876801"/>
+          </a:xfrm>
+          <a:prstGeom prst="rect">
+            <a:avLst/>
+          </a:prstGeom>
+          <a:noFill/>
+          <a:extLst>
+            <a:ext uri="{909E8E84-426E-40DD-AFC4-6F175D3DCCD1}">
+              <a14:hiddenFill xmlns:a14="http://schemas.microsoft.com/office/drawing/2010/main">
+                <a:solidFill>
+                  <a:srgbClr val="FFFFFF"/>
+                </a:solidFill>
+              </a14:hiddenFill>
+            </a:ext>
+          </a:extLst>
+        </p:spPr>
+      </p:pic>
+    </p:spTree>
+    <p:extLst>
+      <p:ext uri="{BB962C8B-B14F-4D97-AF65-F5344CB8AC3E}">
+        <p14:creationId xmlns:p14="http://schemas.microsoft.com/office/powerpoint/2010/main" val="310333961"/>
+      </p:ext>
+    </p:extLst>
+  </p:cSld>
+  <p:clrMapOvr>
+    <a:masterClrMapping/>
+  </p:clrMapOvr>
+</p:sld>
+</file>
+
 <file path=ppt/slides/slide2.xml><?xml version="1.0" encoding="utf-8"?>
 <p:sld xmlns:a="http://schemas.openxmlformats.org/drawingml/2006/main" xmlns:r="http://schemas.openxmlformats.org/officeDocument/2006/relationships" xmlns:p="http://schemas.openxmlformats.org/presentationml/2006/main">
   <p:cSld>
@@ -5215,6 +5383,633 @@
             <a:avLst/>
           </a:prstGeom>
           <a:ln w="254000" cap="rnd">
+            <a:solidFill>
+              <a:srgbClr val="002060"/>
+            </a:solidFill>
+          </a:ln>
+        </p:spPr>
+        <p:style>
+          <a:lnRef idx="1">
+            <a:schemeClr val="accent1"/>
+          </a:lnRef>
+          <a:fillRef idx="0">
+            <a:schemeClr val="accent1"/>
+          </a:fillRef>
+          <a:effectRef idx="0">
+            <a:schemeClr val="accent1"/>
+          </a:effectRef>
+          <a:fontRef idx="minor">
+            <a:schemeClr val="tx1"/>
+          </a:fontRef>
+        </p:style>
+      </p:cxnSp>
+      <p:sp>
+        <p:nvSpPr>
+          <p:cNvPr id="10" name="Abgerundetes Rechteck 9"/>
+          <p:cNvSpPr/>
+          <p:nvPr/>
+        </p:nvSpPr>
+        <p:spPr>
+          <a:xfrm rot="16200000">
+            <a:off x="4735272" y="2221612"/>
+            <a:ext cx="2088232" cy="1982728"/>
+          </a:xfrm>
+          <a:prstGeom prst="roundRect">
+            <a:avLst>
+              <a:gd name="adj" fmla="val 11615"/>
+            </a:avLst>
+          </a:prstGeom>
+          <a:solidFill>
+            <a:schemeClr val="bg1"/>
+          </a:solidFill>
+          <a:ln w="142875">
+            <a:solidFill>
+              <a:srgbClr val="0066FF"/>
+            </a:solidFill>
+          </a:ln>
+        </p:spPr>
+        <p:style>
+          <a:lnRef idx="2">
+            <a:schemeClr val="accent1">
+              <a:shade val="50000"/>
+            </a:schemeClr>
+          </a:lnRef>
+          <a:fillRef idx="1">
+            <a:schemeClr val="accent1"/>
+          </a:fillRef>
+          <a:effectRef idx="0">
+            <a:schemeClr val="accent1"/>
+          </a:effectRef>
+          <a:fontRef idx="minor">
+            <a:schemeClr val="lt1"/>
+          </a:fontRef>
+        </p:style>
+        <p:txBody>
+          <a:bodyPr rtlCol="0" anchor="ctr"/>
+          <a:lstStyle/>
+          <a:p>
+            <a:pPr algn="ctr"/>
+            <a:endParaRPr lang="de-DE">
+              <a:noFill/>
+            </a:endParaRPr>
+          </a:p>
+        </p:txBody>
+      </p:sp>
+      <p:cxnSp>
+        <p:nvCxnSpPr>
+          <p:cNvPr id="11" name="Gerade Verbindung 10"/>
+          <p:cNvCxnSpPr/>
+          <p:nvPr/>
+        </p:nvCxnSpPr>
+        <p:spPr>
+          <a:xfrm>
+            <a:off x="5203528" y="268288"/>
+            <a:ext cx="1152128" cy="0"/>
+          </a:xfrm>
+          <a:prstGeom prst="line">
+            <a:avLst/>
+          </a:prstGeom>
+          <a:ln w="254000" cap="rnd">
+            <a:solidFill>
+              <a:schemeClr val="tx1">
+                <a:lumMod val="50000"/>
+                <a:lumOff val="50000"/>
+              </a:schemeClr>
+            </a:solidFill>
+          </a:ln>
+        </p:spPr>
+        <p:style>
+          <a:lnRef idx="1">
+            <a:schemeClr val="accent1"/>
+          </a:lnRef>
+          <a:fillRef idx="0">
+            <a:schemeClr val="accent1"/>
+          </a:fillRef>
+          <a:effectRef idx="0">
+            <a:schemeClr val="accent1"/>
+          </a:effectRef>
+          <a:fontRef idx="minor">
+            <a:schemeClr val="tx1"/>
+          </a:fontRef>
+        </p:style>
+      </p:cxnSp>
+      <p:grpSp>
+        <p:nvGrpSpPr>
+          <p:cNvPr id="41" name="Gruppieren 40"/>
+          <p:cNvGrpSpPr/>
+          <p:nvPr/>
+        </p:nvGrpSpPr>
+        <p:grpSpPr>
+          <a:xfrm>
+            <a:off x="1691680" y="4797152"/>
+            <a:ext cx="1152128" cy="1080120"/>
+            <a:chOff x="6948264" y="4941168"/>
+            <a:chExt cx="1152128" cy="1080120"/>
+          </a:xfrm>
+        </p:grpSpPr>
+        <p:sp>
+          <p:nvSpPr>
+            <p:cNvPr id="13" name="Rechteck 12"/>
+            <p:cNvSpPr/>
+            <p:nvPr/>
+          </p:nvSpPr>
+          <p:spPr>
+            <a:xfrm>
+              <a:off x="6948264" y="4941168"/>
+              <a:ext cx="1152128" cy="1080120"/>
+            </a:xfrm>
+            <a:prstGeom prst="rect">
+              <a:avLst/>
+            </a:prstGeom>
+            <a:solidFill>
+              <a:schemeClr val="bg1"/>
+            </a:solidFill>
+            <a:ln>
+              <a:noFill/>
+            </a:ln>
+          </p:spPr>
+          <p:style>
+            <a:lnRef idx="2">
+              <a:schemeClr val="accent1">
+                <a:shade val="50000"/>
+              </a:schemeClr>
+            </a:lnRef>
+            <a:fillRef idx="1">
+              <a:schemeClr val="accent1"/>
+            </a:fillRef>
+            <a:effectRef idx="0">
+              <a:schemeClr val="accent1"/>
+            </a:effectRef>
+            <a:fontRef idx="minor">
+              <a:schemeClr val="lt1"/>
+            </a:fontRef>
+          </p:style>
+          <p:txBody>
+            <a:bodyPr rtlCol="0" anchor="ctr"/>
+            <a:lstStyle/>
+            <a:p>
+              <a:pPr algn="ctr"/>
+              <a:endParaRPr lang="de-DE"/>
+            </a:p>
+          </p:txBody>
+        </p:sp>
+        <p:cxnSp>
+          <p:nvCxnSpPr>
+            <p:cNvPr id="14" name="Gerade Verbindung 13"/>
+            <p:cNvCxnSpPr/>
+            <p:nvPr/>
+          </p:nvCxnSpPr>
+          <p:spPr>
+            <a:xfrm flipH="1" flipV="1">
+              <a:off x="7164288" y="5589240"/>
+              <a:ext cx="288032" cy="144016"/>
+            </a:xfrm>
+            <a:prstGeom prst="line">
+              <a:avLst/>
+            </a:prstGeom>
+            <a:ln w="152400" cap="rnd">
+              <a:solidFill>
+                <a:srgbClr val="FF3300"/>
+              </a:solidFill>
+            </a:ln>
+          </p:spPr>
+          <p:style>
+            <a:lnRef idx="1">
+              <a:schemeClr val="accent1"/>
+            </a:lnRef>
+            <a:fillRef idx="0">
+              <a:schemeClr val="accent1"/>
+            </a:fillRef>
+            <a:effectRef idx="0">
+              <a:schemeClr val="accent1"/>
+            </a:effectRef>
+            <a:fontRef idx="minor">
+              <a:schemeClr val="tx1"/>
+            </a:fontRef>
+          </p:style>
+        </p:cxnSp>
+        <p:cxnSp>
+          <p:nvCxnSpPr>
+            <p:cNvPr id="15" name="Gerade Verbindung 14"/>
+            <p:cNvCxnSpPr/>
+            <p:nvPr/>
+          </p:nvCxnSpPr>
+          <p:spPr>
+            <a:xfrm flipV="1">
+              <a:off x="7452320" y="5206116"/>
+              <a:ext cx="360040" cy="527140"/>
+            </a:xfrm>
+            <a:prstGeom prst="line">
+              <a:avLst/>
+            </a:prstGeom>
+            <a:ln w="152400" cap="rnd">
+              <a:solidFill>
+                <a:srgbClr val="FF3300"/>
+              </a:solidFill>
+            </a:ln>
+          </p:spPr>
+          <p:style>
+            <a:lnRef idx="1">
+              <a:schemeClr val="accent1"/>
+            </a:lnRef>
+            <a:fillRef idx="0">
+              <a:schemeClr val="accent1"/>
+            </a:fillRef>
+            <a:effectRef idx="0">
+              <a:schemeClr val="accent1"/>
+            </a:effectRef>
+            <a:fontRef idx="minor">
+              <a:schemeClr val="tx1"/>
+            </a:fontRef>
+          </p:style>
+        </p:cxnSp>
+      </p:grpSp>
+      <p:cxnSp>
+        <p:nvCxnSpPr>
+          <p:cNvPr id="16" name="Gerade Verbindung 15"/>
+          <p:cNvCxnSpPr/>
+          <p:nvPr/>
+        </p:nvCxnSpPr>
+        <p:spPr>
+          <a:xfrm>
+            <a:off x="5232781" y="1340768"/>
+            <a:ext cx="1152128" cy="0"/>
+          </a:xfrm>
+          <a:prstGeom prst="line">
+            <a:avLst/>
+          </a:prstGeom>
+          <a:ln w="254000" cap="rnd">
+            <a:solidFill>
+              <a:schemeClr val="tx1">
+                <a:lumMod val="50000"/>
+                <a:lumOff val="50000"/>
+              </a:schemeClr>
+            </a:solidFill>
+          </a:ln>
+        </p:spPr>
+        <p:style>
+          <a:lnRef idx="1">
+            <a:schemeClr val="accent1"/>
+          </a:lnRef>
+          <a:fillRef idx="0">
+            <a:schemeClr val="accent1"/>
+          </a:fillRef>
+          <a:effectRef idx="0">
+            <a:schemeClr val="accent1"/>
+          </a:effectRef>
+          <a:fontRef idx="minor">
+            <a:schemeClr val="tx1"/>
+          </a:fontRef>
+        </p:style>
+      </p:cxnSp>
+      <p:cxnSp>
+        <p:nvCxnSpPr>
+          <p:cNvPr id="17" name="Gerade Verbindung 16"/>
+          <p:cNvCxnSpPr/>
+          <p:nvPr/>
+        </p:nvCxnSpPr>
+        <p:spPr>
+          <a:xfrm>
+            <a:off x="5203324" y="772344"/>
+            <a:ext cx="1152128" cy="0"/>
+          </a:xfrm>
+          <a:prstGeom prst="line">
+            <a:avLst/>
+          </a:prstGeom>
+          <a:ln w="254000" cap="rnd">
+            <a:solidFill>
+              <a:schemeClr val="tx1">
+                <a:lumMod val="50000"/>
+                <a:lumOff val="50000"/>
+              </a:schemeClr>
+            </a:solidFill>
+          </a:ln>
+        </p:spPr>
+        <p:style>
+          <a:lnRef idx="1">
+            <a:schemeClr val="accent1"/>
+          </a:lnRef>
+          <a:fillRef idx="0">
+            <a:schemeClr val="accent1"/>
+          </a:fillRef>
+          <a:effectRef idx="0">
+            <a:schemeClr val="accent1"/>
+          </a:effectRef>
+          <a:fontRef idx="minor">
+            <a:schemeClr val="tx1"/>
+          </a:fontRef>
+        </p:style>
+      </p:cxnSp>
+      <p:grpSp>
+        <p:nvGrpSpPr>
+          <p:cNvPr id="29" name="Gruppieren 28"/>
+          <p:cNvGrpSpPr/>
+          <p:nvPr/>
+        </p:nvGrpSpPr>
+        <p:grpSpPr>
+          <a:xfrm>
+            <a:off x="5126266" y="2399319"/>
+            <a:ext cx="1253593" cy="1096597"/>
+            <a:chOff x="4717377" y="676220"/>
+            <a:chExt cx="1253593" cy="1096597"/>
+          </a:xfrm>
+        </p:grpSpPr>
+        <p:cxnSp>
+          <p:nvCxnSpPr>
+            <p:cNvPr id="18" name="Gerade Verbindung 17"/>
+            <p:cNvCxnSpPr/>
+            <p:nvPr/>
+          </p:nvCxnSpPr>
+          <p:spPr>
+            <a:xfrm flipV="1">
+              <a:off x="4717377" y="908720"/>
+              <a:ext cx="430687" cy="503798"/>
+            </a:xfrm>
+            <a:prstGeom prst="line">
+              <a:avLst/>
+            </a:prstGeom>
+            <a:ln w="120650" cap="rnd">
+              <a:solidFill>
+                <a:srgbClr val="FF3300"/>
+              </a:solidFill>
+            </a:ln>
+          </p:spPr>
+          <p:style>
+            <a:lnRef idx="1">
+              <a:schemeClr val="accent1"/>
+            </a:lnRef>
+            <a:fillRef idx="0">
+              <a:schemeClr val="accent1"/>
+            </a:fillRef>
+            <a:effectRef idx="0">
+              <a:schemeClr val="accent1"/>
+            </a:effectRef>
+            <a:fontRef idx="minor">
+              <a:schemeClr val="tx1"/>
+            </a:fontRef>
+          </p:style>
+        </p:cxnSp>
+        <p:cxnSp>
+          <p:nvCxnSpPr>
+            <p:cNvPr id="19" name="Gerade Verbindung 18"/>
+            <p:cNvCxnSpPr/>
+            <p:nvPr/>
+          </p:nvCxnSpPr>
+          <p:spPr>
+            <a:xfrm flipH="1" flipV="1">
+              <a:off x="5148064" y="908692"/>
+              <a:ext cx="292506" cy="288060"/>
+            </a:xfrm>
+            <a:prstGeom prst="line">
+              <a:avLst/>
+            </a:prstGeom>
+            <a:ln w="120650" cap="rnd">
+              <a:solidFill>
+                <a:srgbClr val="FF3300"/>
+              </a:solidFill>
+            </a:ln>
+          </p:spPr>
+          <p:style>
+            <a:lnRef idx="1">
+              <a:schemeClr val="accent1"/>
+            </a:lnRef>
+            <a:fillRef idx="0">
+              <a:schemeClr val="accent1"/>
+            </a:fillRef>
+            <a:effectRef idx="0">
+              <a:schemeClr val="accent1"/>
+            </a:effectRef>
+            <a:fontRef idx="minor">
+              <a:schemeClr val="tx1"/>
+            </a:fontRef>
+          </p:style>
+        </p:cxnSp>
+        <p:cxnSp>
+          <p:nvCxnSpPr>
+            <p:cNvPr id="22" name="Gerade Verbindung 21"/>
+            <p:cNvCxnSpPr/>
+            <p:nvPr/>
+          </p:nvCxnSpPr>
+          <p:spPr>
+            <a:xfrm flipV="1">
+              <a:off x="5440570" y="676220"/>
+              <a:ext cx="530400" cy="520532"/>
+            </a:xfrm>
+            <a:prstGeom prst="line">
+              <a:avLst/>
+            </a:prstGeom>
+            <a:ln w="120650" cap="rnd">
+              <a:solidFill>
+                <a:srgbClr val="FF3300"/>
+              </a:solidFill>
+            </a:ln>
+          </p:spPr>
+          <p:style>
+            <a:lnRef idx="1">
+              <a:schemeClr val="accent1"/>
+            </a:lnRef>
+            <a:fillRef idx="0">
+              <a:schemeClr val="accent1"/>
+            </a:fillRef>
+            <a:effectRef idx="0">
+              <a:schemeClr val="accent1"/>
+            </a:effectRef>
+            <a:fontRef idx="minor">
+              <a:schemeClr val="tx1"/>
+            </a:fontRef>
+          </p:style>
+        </p:cxnSp>
+        <p:cxnSp>
+          <p:nvCxnSpPr>
+            <p:cNvPr id="28" name="Gerade Verbindung 27"/>
+            <p:cNvCxnSpPr/>
+            <p:nvPr/>
+          </p:nvCxnSpPr>
+          <p:spPr>
+            <a:xfrm flipV="1">
+              <a:off x="4810604" y="1556817"/>
+              <a:ext cx="0" cy="216000"/>
+            </a:xfrm>
+            <a:prstGeom prst="line">
+              <a:avLst/>
+            </a:prstGeom>
+            <a:ln w="120650" cap="rnd">
+              <a:solidFill>
+                <a:srgbClr val="00359E"/>
+              </a:solidFill>
+            </a:ln>
+          </p:spPr>
+          <p:style>
+            <a:lnRef idx="1">
+              <a:schemeClr val="accent1"/>
+            </a:lnRef>
+            <a:fillRef idx="0">
+              <a:schemeClr val="accent1"/>
+            </a:fillRef>
+            <a:effectRef idx="0">
+              <a:schemeClr val="accent1"/>
+            </a:effectRef>
+            <a:fontRef idx="minor">
+              <a:schemeClr val="tx1"/>
+            </a:fontRef>
+          </p:style>
+        </p:cxnSp>
+        <p:cxnSp>
+          <p:nvCxnSpPr>
+            <p:cNvPr id="30" name="Gerade Verbindung 29"/>
+            <p:cNvCxnSpPr/>
+            <p:nvPr/>
+          </p:nvCxnSpPr>
+          <p:spPr>
+            <a:xfrm flipV="1">
+              <a:off x="5531263" y="1448521"/>
+              <a:ext cx="0" cy="324296"/>
+            </a:xfrm>
+            <a:prstGeom prst="line">
+              <a:avLst/>
+            </a:prstGeom>
+            <a:ln w="120650" cap="rnd">
+              <a:solidFill>
+                <a:srgbClr val="00359E"/>
+              </a:solidFill>
+            </a:ln>
+          </p:spPr>
+          <p:style>
+            <a:lnRef idx="1">
+              <a:schemeClr val="accent1"/>
+            </a:lnRef>
+            <a:fillRef idx="0">
+              <a:schemeClr val="accent1"/>
+            </a:fillRef>
+            <a:effectRef idx="0">
+              <a:schemeClr val="accent1"/>
+            </a:effectRef>
+            <a:fontRef idx="minor">
+              <a:schemeClr val="tx1"/>
+            </a:fontRef>
+          </p:style>
+        </p:cxnSp>
+        <p:cxnSp>
+          <p:nvCxnSpPr>
+            <p:cNvPr id="33" name="Gerade Verbindung 32"/>
+            <p:cNvCxnSpPr/>
+            <p:nvPr/>
+          </p:nvCxnSpPr>
+          <p:spPr>
+            <a:xfrm flipV="1">
+              <a:off x="5171223" y="1316558"/>
+              <a:ext cx="0" cy="456259"/>
+            </a:xfrm>
+            <a:prstGeom prst="line">
+              <a:avLst/>
+            </a:prstGeom>
+            <a:ln w="120650" cap="rnd">
+              <a:solidFill>
+                <a:srgbClr val="00359E"/>
+              </a:solidFill>
+            </a:ln>
+          </p:spPr>
+          <p:style>
+            <a:lnRef idx="1">
+              <a:schemeClr val="accent1"/>
+            </a:lnRef>
+            <a:fillRef idx="0">
+              <a:schemeClr val="accent1"/>
+            </a:fillRef>
+            <a:effectRef idx="0">
+              <a:schemeClr val="accent1"/>
+            </a:effectRef>
+            <a:fontRef idx="minor">
+              <a:schemeClr val="tx1"/>
+            </a:fontRef>
+          </p:style>
+        </p:cxnSp>
+        <p:cxnSp>
+          <p:nvCxnSpPr>
+            <p:cNvPr id="34" name="Gerade Verbindung 33"/>
+            <p:cNvCxnSpPr/>
+            <p:nvPr/>
+          </p:nvCxnSpPr>
+          <p:spPr>
+            <a:xfrm flipV="1">
+              <a:off x="5940152" y="1053225"/>
+              <a:ext cx="0" cy="719592"/>
+            </a:xfrm>
+            <a:prstGeom prst="line">
+              <a:avLst/>
+            </a:prstGeom>
+            <a:ln w="120650" cap="rnd">
+              <a:solidFill>
+                <a:srgbClr val="00359E"/>
+              </a:solidFill>
+            </a:ln>
+          </p:spPr>
+          <p:style>
+            <a:lnRef idx="1">
+              <a:schemeClr val="accent1"/>
+            </a:lnRef>
+            <a:fillRef idx="0">
+              <a:schemeClr val="accent1"/>
+            </a:fillRef>
+            <a:effectRef idx="0">
+              <a:schemeClr val="accent1"/>
+            </a:effectRef>
+            <a:fontRef idx="minor">
+              <a:schemeClr val="tx1"/>
+            </a:fontRef>
+          </p:style>
+        </p:cxnSp>
+      </p:grpSp>
+      <p:cxnSp>
+        <p:nvCxnSpPr>
+          <p:cNvPr id="36" name="Gerade Verbindung 35"/>
+          <p:cNvCxnSpPr/>
+          <p:nvPr/>
+        </p:nvCxnSpPr>
+        <p:spPr>
+          <a:xfrm>
+            <a:off x="5126266" y="3717032"/>
+            <a:ext cx="1296144" cy="0"/>
+          </a:xfrm>
+          <a:prstGeom prst="line">
+            <a:avLst/>
+          </a:prstGeom>
+          <a:ln w="120650" cap="rnd">
+            <a:solidFill>
+              <a:srgbClr val="002060"/>
+            </a:solidFill>
+          </a:ln>
+        </p:spPr>
+        <p:style>
+          <a:lnRef idx="1">
+            <a:schemeClr val="accent1"/>
+          </a:lnRef>
+          <a:fillRef idx="0">
+            <a:schemeClr val="accent1"/>
+          </a:fillRef>
+          <a:effectRef idx="0">
+            <a:schemeClr val="accent1"/>
+          </a:effectRef>
+          <a:fontRef idx="minor">
+            <a:schemeClr val="tx1"/>
+          </a:fontRef>
+        </p:style>
+      </p:cxnSp>
+      <p:cxnSp>
+        <p:nvCxnSpPr>
+          <p:cNvPr id="37" name="Gerade Verbindung 36"/>
+          <p:cNvCxnSpPr/>
+          <p:nvPr/>
+        </p:nvCxnSpPr>
+        <p:spPr>
+          <a:xfrm>
+            <a:off x="5126266" y="3963874"/>
+            <a:ext cx="1296144" cy="0"/>
+          </a:xfrm>
+          <a:prstGeom prst="line">
+            <a:avLst/>
+          </a:prstGeom>
+          <a:ln w="120650" cap="rnd">
             <a:solidFill>
               <a:srgbClr val="002060"/>
             </a:solidFill>
@@ -6493,6 +7288,191 @@
     <p:extLst>
       <p:ext uri="{BB962C8B-B14F-4D97-AF65-F5344CB8AC3E}">
         <p14:creationId xmlns:p14="http://schemas.microsoft.com/office/powerpoint/2010/main" val="1965587939"/>
+      </p:ext>
+    </p:extLst>
+  </p:cSld>
+  <p:clrMapOvr>
+    <a:masterClrMapping/>
+  </p:clrMapOvr>
+</p:sld>
+</file>
+
+<file path=ppt/slides/slide9.xml><?xml version="1.0" encoding="utf-8"?>
+<p:sld xmlns:a="http://schemas.openxmlformats.org/drawingml/2006/main" xmlns:r="http://schemas.openxmlformats.org/officeDocument/2006/relationships" xmlns:p="http://schemas.openxmlformats.org/presentationml/2006/main">
+  <p:cSld>
+    <p:spTree>
+      <p:nvGrpSpPr>
+        <p:cNvPr id="1" name=""/>
+        <p:cNvGrpSpPr/>
+        <p:nvPr/>
+      </p:nvGrpSpPr>
+      <p:grpSpPr>
+        <a:xfrm>
+          <a:off x="0" y="0"/>
+          <a:ext cx="0" cy="0"/>
+          <a:chOff x="0" y="0"/>
+          <a:chExt cx="0" cy="0"/>
+        </a:xfrm>
+      </p:grpSpPr>
+      <p:pic>
+        <p:nvPicPr>
+          <p:cNvPr id="2050" name="Picture 2"/>
+          <p:cNvPicPr>
+            <a:picLocks noChangeAspect="1" noChangeArrowheads="1"/>
+          </p:cNvPicPr>
+          <p:nvPr/>
+        </p:nvPicPr>
+        <p:blipFill>
+          <a:blip r:embed="rId2">
+            <a:extLst>
+              <a:ext uri="{28A0092B-C50C-407E-A947-70E740481C1C}">
+                <a14:useLocalDpi xmlns:a14="http://schemas.microsoft.com/office/drawing/2010/main" val="0"/>
+              </a:ext>
+            </a:extLst>
+          </a:blip>
+          <a:srcRect/>
+          <a:stretch>
+            <a:fillRect/>
+          </a:stretch>
+        </p:blipFill>
+        <p:spPr bwMode="auto">
+          <a:xfrm>
+            <a:off x="676308" y="-243408"/>
+            <a:ext cx="7786687" cy="3967163"/>
+          </a:xfrm>
+          <a:prstGeom prst="rect">
+            <a:avLst/>
+          </a:prstGeom>
+          <a:noFill/>
+          <a:ln>
+            <a:noFill/>
+          </a:ln>
+          <a:extLst>
+            <a:ext uri="{909E8E84-426E-40DD-AFC4-6F175D3DCCD1}">
+              <a14:hiddenFill xmlns:a14="http://schemas.microsoft.com/office/drawing/2010/main">
+                <a:solidFill>
+                  <a:schemeClr val="accent1"/>
+                </a:solidFill>
+              </a14:hiddenFill>
+            </a:ext>
+            <a:ext uri="{91240B29-F687-4F45-9708-019B960494DF}">
+              <a14:hiddenLine xmlns:a14="http://schemas.microsoft.com/office/drawing/2010/main" w="9525">
+                <a:solidFill>
+                  <a:schemeClr val="tx1"/>
+                </a:solidFill>
+                <a:miter lim="800000"/>
+                <a:headEnd/>
+                <a:tailEnd/>
+              </a14:hiddenLine>
+            </a:ext>
+          </a:extLst>
+        </p:spPr>
+      </p:pic>
+      <p:cxnSp>
+        <p:nvCxnSpPr>
+          <p:cNvPr id="5" name="Gerade Verbindung 4"/>
+          <p:cNvCxnSpPr/>
+          <p:nvPr/>
+        </p:nvCxnSpPr>
+        <p:spPr>
+          <a:xfrm>
+            <a:off x="827584" y="1628800"/>
+            <a:ext cx="0" cy="1728192"/>
+          </a:xfrm>
+          <a:prstGeom prst="line">
+            <a:avLst/>
+          </a:prstGeom>
+        </p:spPr>
+        <p:style>
+          <a:lnRef idx="1">
+            <a:schemeClr val="accent1"/>
+          </a:lnRef>
+          <a:fillRef idx="0">
+            <a:schemeClr val="accent1"/>
+          </a:fillRef>
+          <a:effectRef idx="0">
+            <a:schemeClr val="accent1"/>
+          </a:effectRef>
+          <a:fontRef idx="minor">
+            <a:schemeClr val="tx1"/>
+          </a:fontRef>
+        </p:style>
+      </p:cxnSp>
+      <p:cxnSp>
+        <p:nvCxnSpPr>
+          <p:cNvPr id="7" name="Gerade Verbindung 6"/>
+          <p:cNvCxnSpPr/>
+          <p:nvPr/>
+        </p:nvCxnSpPr>
+        <p:spPr>
+          <a:xfrm flipH="1">
+            <a:off x="827584" y="3717291"/>
+            <a:ext cx="2088232" cy="0"/>
+          </a:xfrm>
+          <a:prstGeom prst="line">
+            <a:avLst/>
+          </a:prstGeom>
+        </p:spPr>
+        <p:style>
+          <a:lnRef idx="1">
+            <a:schemeClr val="accent1"/>
+          </a:lnRef>
+          <a:fillRef idx="0">
+            <a:schemeClr val="accent1"/>
+          </a:fillRef>
+          <a:effectRef idx="0">
+            <a:schemeClr val="accent1"/>
+          </a:effectRef>
+          <a:fontRef idx="minor">
+            <a:schemeClr val="tx1"/>
+          </a:fontRef>
+        </p:style>
+      </p:cxnSp>
+      <p:pic>
+        <p:nvPicPr>
+          <p:cNvPr id="2052" name="Picture 4" descr="User Manual Icon – Free Download, PNG and Vector"/>
+          <p:cNvPicPr>
+            <a:picLocks noChangeAspect="1" noChangeArrowheads="1"/>
+          </p:cNvPicPr>
+          <p:nvPr/>
+        </p:nvPicPr>
+        <p:blipFill>
+          <a:blip r:embed="rId3">
+            <a:extLst>
+              <a:ext uri="{28A0092B-C50C-407E-A947-70E740481C1C}">
+                <a14:useLocalDpi xmlns:a14="http://schemas.microsoft.com/office/drawing/2010/main" val="0"/>
+              </a:ext>
+            </a:extLst>
+          </a:blip>
+          <a:srcRect/>
+          <a:stretch>
+            <a:fillRect/>
+          </a:stretch>
+        </p:blipFill>
+        <p:spPr bwMode="auto">
+          <a:xfrm>
+            <a:off x="1979712" y="2708920"/>
+            <a:ext cx="4305300" cy="4305301"/>
+          </a:xfrm>
+          <a:prstGeom prst="rect">
+            <a:avLst/>
+          </a:prstGeom>
+          <a:noFill/>
+          <a:extLst>
+            <a:ext uri="{909E8E84-426E-40DD-AFC4-6F175D3DCCD1}">
+              <a14:hiddenFill xmlns:a14="http://schemas.microsoft.com/office/drawing/2010/main">
+                <a:solidFill>
+                  <a:srgbClr val="FFFFFF"/>
+                </a:solidFill>
+              </a14:hiddenFill>
+            </a:ext>
+          </a:extLst>
+        </p:spPr>
+      </p:pic>
+    </p:spTree>
+    <p:extLst>
+      <p:ext uri="{BB962C8B-B14F-4D97-AF65-F5344CB8AC3E}">
+        <p14:creationId xmlns:p14="http://schemas.microsoft.com/office/powerpoint/2010/main" val="1610190195"/>
       </p:ext>
     </p:extLst>
   </p:cSld>

</xml_diff>